<commit_message>
Docker 2 - Manipulating Docker
</commit_message>
<xml_diff>
--- a/docker/Docker - 02 - Manipulating Containers.pptx
+++ b/docker/Docker - 02 - Manipulating Containers.pptx
@@ -23,32 +23,31 @@
     <p:sldId id="380" r:id="rId16"/>
     <p:sldId id="381" r:id="rId17"/>
     <p:sldId id="405" r:id="rId18"/>
-    <p:sldId id="406" r:id="rId19"/>
-    <p:sldId id="407" r:id="rId20"/>
-    <p:sldId id="408" r:id="rId21"/>
-    <p:sldId id="409" r:id="rId22"/>
-    <p:sldId id="410" r:id="rId23"/>
-    <p:sldId id="434" r:id="rId24"/>
-    <p:sldId id="435" r:id="rId25"/>
-    <p:sldId id="436" r:id="rId26"/>
-    <p:sldId id="437" r:id="rId27"/>
-    <p:sldId id="440" r:id="rId28"/>
-    <p:sldId id="438" r:id="rId29"/>
-    <p:sldId id="439" r:id="rId30"/>
-    <p:sldId id="441" r:id="rId31"/>
-    <p:sldId id="442" r:id="rId32"/>
-    <p:sldId id="304" r:id="rId33"/>
+    <p:sldId id="407" r:id="rId19"/>
+    <p:sldId id="408" r:id="rId20"/>
+    <p:sldId id="409" r:id="rId21"/>
+    <p:sldId id="410" r:id="rId22"/>
+    <p:sldId id="434" r:id="rId23"/>
+    <p:sldId id="435" r:id="rId24"/>
+    <p:sldId id="436" r:id="rId25"/>
+    <p:sldId id="437" r:id="rId26"/>
+    <p:sldId id="440" r:id="rId27"/>
+    <p:sldId id="438" r:id="rId28"/>
+    <p:sldId id="439" r:id="rId29"/>
+    <p:sldId id="441" r:id="rId30"/>
+    <p:sldId id="442" r:id="rId31"/>
+    <p:sldId id="304" r:id="rId32"/>
   </p:sldIdLst>
   <p:sldSz cx="9144000" cy="5143500"/>
   <p:notesSz cx="6858000" cy="9144000"/>
   <p:embeddedFontLst>
     <p:embeddedFont>
       <p:font typeface="PT Sans Narrow" panose="020B0506020203020204"/>
-      <p:regular r:id="rId37"/>
+      <p:regular r:id="rId36"/>
     </p:embeddedFont>
     <p:embeddedFont>
       <p:font typeface="Open Sans" panose="020B0306030504020204"/>
-      <p:regular r:id="rId38"/>
+      <p:regular r:id="rId37"/>
     </p:embeddedFont>
   </p:embeddedFontLst>
   <p:defaultTextStyle>
@@ -2032,6 +2031,70 @@
               </a:spcAft>
               <a:buNone/>
             </a:pPr>
+            <a:r>
+              <a:rPr lang="en-US"/>
+              <a:t>stop and kill are used to stop and kill a container. But it has a different</a:t>
+            </a:r>
+            <a:endParaRPr lang="en-US"/>
+          </a:p>
+          <a:p>
+            <a:pPr marL="0" lvl="0" indent="0" algn="l" rtl="0">
+              <a:spcBef>
+                <a:spcPts val="0"/>
+              </a:spcBef>
+              <a:spcAft>
+                <a:spcPts val="0"/>
+              </a:spcAft>
+              <a:buNone/>
+            </a:pPr>
+            <a:r>
+              <a:rPr lang="en-US"/>
+              <a:t>when use stop command, a hardware signal sent  to the primary process inside the container (SIGTERM mean terminate signal) to let the container know to shutdown now with a little bit time to clean up the conainer (save files, or emit some messages,...)</a:t>
+            </a:r>
+            <a:endParaRPr lang="en-US"/>
+          </a:p>
+          <a:p>
+            <a:pPr marL="0" lvl="0" indent="0" algn="l" rtl="0">
+              <a:spcBef>
+                <a:spcPts val="0"/>
+              </a:spcBef>
+              <a:spcAft>
+                <a:spcPts val="0"/>
+              </a:spcAft>
+              <a:buNone/>
+            </a:pPr>
+            <a:r>
+              <a:rPr lang="en-US"/>
+              <a:t>- if the container does not stop in 10 seconds, it wil call kill command.</a:t>
+            </a:r>
+            <a:endParaRPr lang="en-US"/>
+          </a:p>
+          <a:p>
+            <a:pPr marL="0" lvl="0" indent="0" algn="l" rtl="0">
+              <a:spcBef>
+                <a:spcPts val="0"/>
+              </a:spcBef>
+              <a:spcAft>
+                <a:spcPts val="0"/>
+              </a:spcAft>
+              <a:buNone/>
+            </a:pPr>
+            <a:endParaRPr lang="en-US"/>
+          </a:p>
+          <a:p>
+            <a:pPr marL="0" lvl="0" indent="0" algn="l" rtl="0">
+              <a:spcBef>
+                <a:spcPts val="0"/>
+              </a:spcBef>
+              <a:spcAft>
+                <a:spcPts val="0"/>
+              </a:spcAft>
+              <a:buNone/>
+            </a:pPr>
+            <a:r>
+              <a:rPr lang="en-US"/>
+              <a:t>kill command: to sent a signal to the primary container to kill the container immediatelly.</a:t>
+            </a:r>
             <a:endParaRPr lang="en-US"/>
           </a:p>
         </p:txBody>
@@ -2132,70 +2195,6 @@
               </a:spcAft>
               <a:buNone/>
             </a:pPr>
-            <a:r>
-              <a:rPr lang="en-US"/>
-              <a:t>stop and kill are used to stop and kill a container. But it has a different</a:t>
-            </a:r>
-            <a:endParaRPr lang="en-US"/>
-          </a:p>
-          <a:p>
-            <a:pPr marL="0" lvl="0" indent="0" algn="l" rtl="0">
-              <a:spcBef>
-                <a:spcPts val="0"/>
-              </a:spcBef>
-              <a:spcAft>
-                <a:spcPts val="0"/>
-              </a:spcAft>
-              <a:buNone/>
-            </a:pPr>
-            <a:r>
-              <a:rPr lang="en-US"/>
-              <a:t>when use stop command, a hardware signal sent  to the primary process inside the container (SIGTERM mean terminate signal) to let the container know to shutdown now with a little bit time to clean up the conainer (save files, or emit some messages,...)</a:t>
-            </a:r>
-            <a:endParaRPr lang="en-US"/>
-          </a:p>
-          <a:p>
-            <a:pPr marL="0" lvl="0" indent="0" algn="l" rtl="0">
-              <a:spcBef>
-                <a:spcPts val="0"/>
-              </a:spcBef>
-              <a:spcAft>
-                <a:spcPts val="0"/>
-              </a:spcAft>
-              <a:buNone/>
-            </a:pPr>
-            <a:r>
-              <a:rPr lang="en-US"/>
-              <a:t>- if the container does not stop in 10 seconds, it wil call kill command.</a:t>
-            </a:r>
-            <a:endParaRPr lang="en-US"/>
-          </a:p>
-          <a:p>
-            <a:pPr marL="0" lvl="0" indent="0" algn="l" rtl="0">
-              <a:spcBef>
-                <a:spcPts val="0"/>
-              </a:spcBef>
-              <a:spcAft>
-                <a:spcPts val="0"/>
-              </a:spcAft>
-              <a:buNone/>
-            </a:pPr>
-            <a:endParaRPr lang="en-US"/>
-          </a:p>
-          <a:p>
-            <a:pPr marL="0" lvl="0" indent="0" algn="l" rtl="0">
-              <a:spcBef>
-                <a:spcPts val="0"/>
-              </a:spcBef>
-              <a:spcAft>
-                <a:spcPts val="0"/>
-              </a:spcAft>
-              <a:buNone/>
-            </a:pPr>
-            <a:r>
-              <a:rPr lang="en-US"/>
-              <a:t>kill command: to sent a signal to the primary container to kill the container immediatelly.</a:t>
-            </a:r>
             <a:endParaRPr lang="en-US"/>
           </a:p>
         </p:txBody>
@@ -2795,6 +2794,26 @@
               </a:spcAft>
               <a:buNone/>
             </a:pPr>
+            <a:r>
+              <a:rPr lang="en-US"/>
+              <a:t>When you run a docker in your local machine, every single container that you are running is running inside of a virtual machine running Linux</a:t>
+            </a:r>
+            <a:endParaRPr lang="en-US"/>
+          </a:p>
+          <a:p>
+            <a:pPr marL="0" lvl="0" indent="0" algn="l" rtl="0">
+              <a:spcBef>
+                <a:spcPts val="0"/>
+              </a:spcBef>
+              <a:spcAft>
+                <a:spcPts val="0"/>
+              </a:spcAft>
+              <a:buNone/>
+            </a:pPr>
+            <a:r>
+              <a:rPr lang="en-US"/>
+              <a:t>So these process are really being executed inside of a Linux world, even if you are on Mac or Windows</a:t>
+            </a:r>
             <a:endParaRPr lang="en-US"/>
           </a:p>
         </p:txBody>
@@ -2897,23 +2916,7 @@
             </a:pPr>
             <a:r>
               <a:rPr lang="en-US"/>
-              <a:t>When you run a docker in your local machine, every single container that you are running is running inside of a virtual machine running Linux</a:t>
-            </a:r>
-            <a:endParaRPr lang="en-US"/>
-          </a:p>
-          <a:p>
-            <a:pPr marL="0" lvl="0" indent="0" algn="l" rtl="0">
-              <a:spcBef>
-                <a:spcPts val="0"/>
-              </a:spcBef>
-              <a:spcAft>
-                <a:spcPts val="0"/>
-              </a:spcAft>
-              <a:buNone/>
-            </a:pPr>
-            <a:r>
-              <a:rPr lang="en-US"/>
-              <a:t>So these process are really being executed inside of a Linux world, even if you are on Mac or Windows</a:t>
+              <a:t>STDERR: communicate to other outside invironment and return the data and show on the terminal</a:t>
             </a:r>
             <a:endParaRPr lang="en-US"/>
           </a:p>
@@ -3015,10 +3018,6 @@
               </a:spcAft>
               <a:buNone/>
             </a:pPr>
-            <a:r>
-              <a:rPr lang="en-US"/>
-              <a:t>STDERR: communicate to other outside invironment and return the data and show on the terminal</a:t>
-            </a:r>
             <a:endParaRPr lang="en-US"/>
           </a:p>
         </p:txBody>
@@ -3319,6 +3318,10 @@
               </a:spcAft>
               <a:buNone/>
             </a:pPr>
+            <a:r>
+              <a:rPr lang="en-US"/>
+              <a:t>run two commands are the same to check its container are shared folder or not</a:t>
+            </a:r>
             <a:endParaRPr lang="en-US"/>
           </a:p>
         </p:txBody>
@@ -3336,7 +3339,7 @@
   <p:cSld>
     <p:spTree>
       <p:nvGrpSpPr>
-        <p:cNvPr id="74" name="Shape 74"/>
+        <p:cNvPr id="447" name="Shape 447"/>
         <p:cNvGrpSpPr/>
         <p:nvPr/>
       </p:nvGrpSpPr>
@@ -3350,7 +3353,7 @@
       </p:grpSpPr>
       <p:sp>
         <p:nvSpPr>
-          <p:cNvPr id="75" name="Google Shape;75;gcad7496ea3_0_0:notes"/>
+          <p:cNvPr id="448" name="Google Shape;448;gcb89376c82_0_37:notes"/>
           <p:cNvSpPr/>
           <p:nvPr>
             <p:ph type="sldImg" idx="2"/>
@@ -3389,7 +3392,7 @@
       </p:sp>
       <p:sp>
         <p:nvSpPr>
-          <p:cNvPr id="76" name="Google Shape;76;gcad7496ea3_0_0:notes"/>
+          <p:cNvPr id="449" name="Google Shape;449;gcb89376c82_0_37:notes"/>
           <p:cNvSpPr txBox="1"/>
           <p:nvPr>
             <p:ph type="body" idx="1"/>
@@ -3419,11 +3422,6 @@
               </a:spcAft>
               <a:buNone/>
             </a:pPr>
-            <a:r>
-              <a:rPr lang="en-US"/>
-              <a:t>run two commands are the same to check its container are shared folder or not</a:t>
-            </a:r>
-            <a:endParaRPr lang="en-US"/>
           </a:p>
         </p:txBody>
       </p:sp>
@@ -3494,105 +3492,6 @@
       <p:sp>
         <p:nvSpPr>
           <p:cNvPr id="76" name="Google Shape;76;gcad7496ea3_0_0:notes"/>
-          <p:cNvSpPr txBox="1"/>
-          <p:nvPr>
-            <p:ph type="body" idx="1"/>
-          </p:nvPr>
-        </p:nvSpPr>
-        <p:spPr>
-          <a:xfrm>
-            <a:off x="685800" y="4343400"/>
-            <a:ext cx="5486400" cy="4114800"/>
-          </a:xfrm>
-          <a:prstGeom prst="rect">
-            <a:avLst/>
-          </a:prstGeom>
-        </p:spPr>
-        <p:txBody>
-          <a:bodyPr spcFirstLastPara="1" wrap="square" lIns="91425" tIns="91425" rIns="91425" bIns="91425" anchor="t" anchorCtr="0">
-            <a:noAutofit/>
-          </a:bodyPr>
-          <a:lstStyle/>
-          <a:p>
-            <a:pPr marL="0" lvl="0" indent="0" algn="l" rtl="0">
-              <a:spcBef>
-                <a:spcPts val="0"/>
-              </a:spcBef>
-              <a:spcAft>
-                <a:spcPts val="0"/>
-              </a:spcAft>
-              <a:buNone/>
-            </a:pPr>
-          </a:p>
-        </p:txBody>
-      </p:sp>
-    </p:spTree>
-  </p:cSld>
-  <p:clrMapOvr>
-    <a:masterClrMapping/>
-  </p:clrMapOvr>
-</p:notes>
-</file>
-
-<file path=ppt/notesSlides/notesSlide30.xml><?xml version="1.0" encoding="utf-8"?>
-<p:notes xmlns:a="http://schemas.openxmlformats.org/drawingml/2006/main" xmlns:r="http://schemas.openxmlformats.org/officeDocument/2006/relationships" xmlns:p="http://schemas.openxmlformats.org/presentationml/2006/main" showMasterPhAnim="0" showMasterSp="0">
-  <p:cSld>
-    <p:spTree>
-      <p:nvGrpSpPr>
-        <p:cNvPr id="447" name="Shape 447"/>
-        <p:cNvGrpSpPr/>
-        <p:nvPr/>
-      </p:nvGrpSpPr>
-      <p:grpSpPr>
-        <a:xfrm>
-          <a:off x="0" y="0"/>
-          <a:ext cx="0" cy="0"/>
-          <a:chOff x="0" y="0"/>
-          <a:chExt cx="0" cy="0"/>
-        </a:xfrm>
-      </p:grpSpPr>
-      <p:sp>
-        <p:nvSpPr>
-          <p:cNvPr id="448" name="Google Shape;448;gcb89376c82_0_37:notes"/>
-          <p:cNvSpPr/>
-          <p:nvPr>
-            <p:ph type="sldImg" idx="2"/>
-          </p:nvPr>
-        </p:nvSpPr>
-        <p:spPr>
-          <a:xfrm>
-            <a:off x="381300" y="685800"/>
-            <a:ext cx="6096000" cy="3429000"/>
-          </a:xfrm>
-          <a:custGeom>
-            <a:avLst/>
-            <a:gdLst/>
-            <a:ahLst/>
-            <a:cxnLst/>
-            <a:rect l="l" t="t" r="r" b="b"/>
-            <a:pathLst>
-              <a:path w="120000" h="120000" extrusionOk="0">
-                <a:moveTo>
-                  <a:pt x="0" y="0"/>
-                </a:moveTo>
-                <a:lnTo>
-                  <a:pt x="120000" y="0"/>
-                </a:lnTo>
-                <a:lnTo>
-                  <a:pt x="120000" y="120000"/>
-                </a:lnTo>
-                <a:lnTo>
-                  <a:pt x="0" y="120000"/>
-                </a:lnTo>
-                <a:close/>
-              </a:path>
-            </a:pathLst>
-          </a:custGeom>
-        </p:spPr>
-      </p:sp>
-      <p:sp>
-        <p:nvSpPr>
-          <p:cNvPr id="449" name="Google Shape;449;gcb89376c82_0_37:notes"/>
           <p:cNvSpPr txBox="1"/>
           <p:nvPr>
             <p:ph type="body" idx="1"/>
@@ -9842,8 +9741,8 @@
         </p:blipFill>
         <p:spPr>
           <a:xfrm>
-            <a:off x="569595" y="1735455"/>
-            <a:ext cx="3766820" cy="1986915"/>
+            <a:off x="311785" y="1623695"/>
+            <a:ext cx="4184015" cy="2207260"/>
           </a:xfrm>
           <a:prstGeom prst="rect">
             <a:avLst/>
@@ -9852,7 +9751,7 @@
       </p:pic>
       <p:pic>
         <p:nvPicPr>
-          <p:cNvPr id="4" name="Picture 3"/>
+          <p:cNvPr id="1" name="Picture 0"/>
           <p:cNvPicPr>
             <a:picLocks noChangeAspect="1"/>
           </p:cNvPicPr>
@@ -9866,8 +9765,8 @@
         </p:blipFill>
         <p:spPr>
           <a:xfrm>
-            <a:off x="4762500" y="1609725"/>
-            <a:ext cx="3735070" cy="2054225"/>
+            <a:off x="4605020" y="1623695"/>
+            <a:ext cx="4227195" cy="2210435"/>
           </a:xfrm>
           <a:prstGeom prst="rect">
             <a:avLst/>
@@ -10099,7 +9998,7 @@
             </a:pPr>
             <a:r>
               <a:rPr lang="en-US" sz="2940"/>
-              <a:t>Starting stopped container</a:t>
+              <a:t>List of containers running</a:t>
             </a:r>
             <a:endParaRPr lang="en-US" sz="2940" b="0">
               <a:solidFill>
@@ -10240,7 +10139,7 @@
             </a:pPr>
             <a:r>
               <a:rPr lang="en-US" sz="2940"/>
-              <a:t>Starting stopped container</a:t>
+              <a:t>Overring default commands</a:t>
             </a:r>
             <a:endParaRPr lang="en-US" sz="2940" b="0">
               <a:solidFill>
@@ -10274,22 +10173,6 @@
           </a:prstGeom>
         </p:spPr>
       </p:pic>
-      <p:sp>
-        <p:nvSpPr>
-          <p:cNvPr id="3" name="Text Placeholder 2"/>
-          <p:cNvSpPr/>
-          <p:nvPr>
-            <p:ph type="body" idx="1"/>
-          </p:nvPr>
-        </p:nvSpPr>
-        <p:spPr/>
-        <p:txBody>
-          <a:bodyPr/>
-          <a:p>
-            <a:endParaRPr lang="en-US"/>
-          </a:p>
-        </p:txBody>
-      </p:sp>
     </p:spTree>
   </p:cSld>
   <p:clrMapOvr>
@@ -10672,7 +10555,7 @@
             </a:pPr>
             <a:r>
               <a:rPr lang="en-US" sz="2940"/>
-              <a:t>Retrieving log Outputs</a:t>
+              <a:t>Stopping container</a:t>
             </a:r>
             <a:endParaRPr lang="en-US" sz="2940" b="0">
               <a:solidFill>
@@ -10692,8 +10575,8 @@
         </p:nvSpPr>
         <p:spPr>
           <a:xfrm>
-            <a:off x="311785" y="3763645"/>
-            <a:ext cx="8213725" cy="1052195"/>
+            <a:off x="311785" y="831215"/>
+            <a:ext cx="8243570" cy="3984625"/>
           </a:xfrm>
           <a:prstGeom prst="rect">
             <a:avLst/>
@@ -10701,7 +10584,7 @@
         </p:spPr>
         <p:txBody>
           <a:bodyPr spcFirstLastPara="1" wrap="square" lIns="91425" tIns="91425" rIns="91425" bIns="91425" anchor="t" anchorCtr="0">
-            <a:normAutofit fontScale="90000"/>
+            <a:normAutofit/>
           </a:bodyPr>
           <a:p>
             <a:pPr marL="114300" lvl="0" indent="0" algn="l" rtl="0">
@@ -10718,28 +10601,7 @@
               <a:rPr lang="en-US" altLang="en-GB" b="1">
                 <a:sym typeface="+mn-ea"/>
               </a:rPr>
-              <a:t>docker logs &lt;&lt;container_id&gt;&gt;</a:t>
-            </a:r>
-            <a:endParaRPr lang="en-US" altLang="en-GB" b="1">
-              <a:sym typeface="+mn-ea"/>
-            </a:endParaRPr>
-          </a:p>
-          <a:p>
-            <a:pPr marL="114300" lvl="0" indent="0" algn="l" rtl="0">
-              <a:spcBef>
-                <a:spcPts val="0"/>
-              </a:spcBef>
-              <a:spcAft>
-                <a:spcPts val="0"/>
-              </a:spcAft>
-              <a:buSzPts val="1800"/>
-              <a:buNone/>
-            </a:pPr>
-            <a:r>
-              <a:rPr lang="en-US" altLang="en-GB" b="1">
-                <a:sym typeface="+mn-ea"/>
-              </a:rPr>
-              <a:t>=&gt; With this command, we don’t re-run the container again. It only emitted what it works</a:t>
+              <a:t>First: create, run and view log of the container </a:t>
             </a:r>
             <a:endParaRPr lang="en-US" b="1">
               <a:solidFill>
@@ -10751,7 +10613,7 @@
       </p:sp>
       <p:pic>
         <p:nvPicPr>
-          <p:cNvPr id="2" name="Picture 1"/>
+          <p:cNvPr id="4" name="Picture 3"/>
           <p:cNvPicPr>
             <a:picLocks noChangeAspect="1"/>
           </p:cNvPicPr>
@@ -10765,8 +10627,8 @@
         </p:blipFill>
         <p:spPr>
           <a:xfrm>
-            <a:off x="723900" y="907415"/>
-            <a:ext cx="7696200" cy="2390775"/>
+            <a:off x="1485900" y="1371600"/>
+            <a:ext cx="6172835" cy="3233420"/>
           </a:xfrm>
           <a:prstGeom prst="rect">
             <a:avLst/>
@@ -10843,55 +10705,9 @@
           </a:p>
         </p:txBody>
       </p:sp>
-      <p:sp>
-        <p:nvSpPr>
-          <p:cNvPr id="79" name="Google Shape;79;p15"/>
-          <p:cNvSpPr txBox="1"/>
-          <p:nvPr>
-            <p:ph type="body" idx="1"/>
-          </p:nvPr>
-        </p:nvSpPr>
-        <p:spPr>
-          <a:xfrm>
-            <a:off x="311785" y="831215"/>
-            <a:ext cx="8243570" cy="3984625"/>
-          </a:xfrm>
-          <a:prstGeom prst="rect">
-            <a:avLst/>
-          </a:prstGeom>
-        </p:spPr>
-        <p:txBody>
-          <a:bodyPr spcFirstLastPara="1" wrap="square" lIns="91425" tIns="91425" rIns="91425" bIns="91425" anchor="t" anchorCtr="0">
-            <a:normAutofit/>
-          </a:bodyPr>
-          <a:p>
-            <a:pPr marL="114300" lvl="0" indent="0" algn="l" rtl="0">
-              <a:spcBef>
-                <a:spcPts val="0"/>
-              </a:spcBef>
-              <a:spcAft>
-                <a:spcPts val="0"/>
-              </a:spcAft>
-              <a:buSzPts val="1800"/>
-              <a:buNone/>
-            </a:pPr>
-            <a:r>
-              <a:rPr lang="en-US" altLang="en-GB" b="1">
-                <a:sym typeface="+mn-ea"/>
-              </a:rPr>
-              <a:t>First, create, run and view log of the container </a:t>
-            </a:r>
-            <a:endParaRPr lang="en-US" b="1">
-              <a:solidFill>
-                <a:srgbClr val="B45F06"/>
-              </a:solidFill>
-            </a:endParaRPr>
-          </a:p>
-        </p:txBody>
-      </p:sp>
       <p:pic>
         <p:nvPicPr>
-          <p:cNvPr id="4" name="Picture 3"/>
+          <p:cNvPr id="2" name="Picture 1"/>
           <p:cNvPicPr>
             <a:picLocks noChangeAspect="1"/>
           </p:cNvPicPr>
@@ -10905,8 +10721,32 @@
         </p:blipFill>
         <p:spPr>
           <a:xfrm>
-            <a:off x="1485900" y="1371600"/>
-            <a:ext cx="6172835" cy="3233420"/>
+            <a:off x="2097405" y="858520"/>
+            <a:ext cx="4250690" cy="1116965"/>
+          </a:xfrm>
+          <a:prstGeom prst="rect">
+            <a:avLst/>
+          </a:prstGeom>
+        </p:spPr>
+      </p:pic>
+      <p:pic>
+        <p:nvPicPr>
+          <p:cNvPr id="4" name="Picture 3"/>
+          <p:cNvPicPr>
+            <a:picLocks noChangeAspect="1"/>
+          </p:cNvPicPr>
+          <p:nvPr/>
+        </p:nvPicPr>
+        <p:blipFill>
+          <a:blip r:embed="rId2"/>
+          <a:stretch>
+            <a:fillRect/>
+          </a:stretch>
+        </p:blipFill>
+        <p:spPr>
+          <a:xfrm>
+            <a:off x="721360" y="1877695"/>
+            <a:ext cx="7002780" cy="2905760"/>
           </a:xfrm>
           <a:prstGeom prst="rect">
             <a:avLst/>
@@ -10999,38 +10839,81 @@
         </p:blipFill>
         <p:spPr>
           <a:xfrm>
-            <a:off x="2097405" y="858520"/>
-            <a:ext cx="4250690" cy="1116965"/>
+            <a:off x="311785" y="1607820"/>
+            <a:ext cx="8582025" cy="2362200"/>
           </a:xfrm>
           <a:prstGeom prst="rect">
             <a:avLst/>
           </a:prstGeom>
         </p:spPr>
       </p:pic>
-      <p:pic>
-        <p:nvPicPr>
-          <p:cNvPr id="4" name="Picture 3"/>
-          <p:cNvPicPr>
-            <a:picLocks noChangeAspect="1"/>
-          </p:cNvPicPr>
-          <p:nvPr/>
-        </p:nvPicPr>
-        <p:blipFill>
-          <a:blip r:embed="rId2"/>
-          <a:stretch>
-            <a:fillRect/>
-          </a:stretch>
-        </p:blipFill>
-        <p:spPr>
-          <a:xfrm>
-            <a:off x="721360" y="1877695"/>
-            <a:ext cx="7002780" cy="2905760"/>
-          </a:xfrm>
-          <a:prstGeom prst="rect">
-            <a:avLst/>
-          </a:prstGeom>
-        </p:spPr>
-      </p:pic>
+      <p:sp>
+        <p:nvSpPr>
+          <p:cNvPr id="79" name="Google Shape;79;p15"/>
+          <p:cNvSpPr txBox="1"/>
+          <p:nvPr>
+            <p:ph type="body" idx="1"/>
+          </p:nvPr>
+        </p:nvSpPr>
+        <p:spPr>
+          <a:xfrm>
+            <a:off x="311785" y="831850"/>
+            <a:ext cx="8520430" cy="3736975"/>
+          </a:xfrm>
+          <a:prstGeom prst="rect">
+            <a:avLst/>
+          </a:prstGeom>
+        </p:spPr>
+        <p:txBody>
+          <a:bodyPr spcFirstLastPara="1" wrap="square" lIns="91425" tIns="91425" rIns="91425" bIns="91425" anchor="t" anchorCtr="0">
+            <a:normAutofit lnSpcReduction="10000"/>
+          </a:bodyPr>
+          <a:p>
+            <a:pPr marL="114300" lvl="0" indent="0" algn="l" rtl="0">
+              <a:spcBef>
+                <a:spcPts val="0"/>
+              </a:spcBef>
+              <a:spcAft>
+                <a:spcPts val="0"/>
+              </a:spcAft>
+              <a:buSzPts val="1800"/>
+              <a:buNone/>
+            </a:pPr>
+            <a:r>
+              <a:rPr lang="en-US" altLang="en-GB" b="1">
+                <a:sym typeface="+mn-ea"/>
+              </a:rPr>
+              <a:t>&gt;&gt; docker stop &lt;container_id&gt;</a:t>
+            </a:r>
+            <a:endParaRPr lang="en-US" altLang="en-GB" b="1">
+              <a:sym typeface="+mn-ea"/>
+            </a:endParaRPr>
+          </a:p>
+          <a:p>
+            <a:pPr marL="457200" lvl="0" indent="-342900" algn="l" rtl="0">
+              <a:spcBef>
+                <a:spcPts val="0"/>
+              </a:spcBef>
+              <a:spcAft>
+                <a:spcPts val="0"/>
+              </a:spcAft>
+              <a:buSzPts val="1800"/>
+              <a:buChar char="+"/>
+            </a:pPr>
+            <a:r>
+              <a:rPr lang="en-US" altLang="en-GB" b="1">
+                <a:sym typeface="+mn-ea"/>
+              </a:rPr>
+              <a:t>Waiting for over 10 seconds to stop the container</a:t>
+            </a:r>
+            <a:endParaRPr lang="en-US" b="1">
+              <a:solidFill>
+                <a:srgbClr val="B45F06"/>
+              </a:solidFill>
+            </a:endParaRPr>
+          </a:p>
+        </p:txBody>
+      </p:sp>
     </p:spTree>
   </p:cSld>
   <p:clrMapOvr>
@@ -11101,6 +10984,94 @@
           </a:p>
         </p:txBody>
       </p:sp>
+      <p:sp>
+        <p:nvSpPr>
+          <p:cNvPr id="79" name="Google Shape;79;p15"/>
+          <p:cNvSpPr txBox="1"/>
+          <p:nvPr>
+            <p:ph type="body" idx="1"/>
+          </p:nvPr>
+        </p:nvSpPr>
+        <p:spPr>
+          <a:xfrm>
+            <a:off x="311785" y="831850"/>
+            <a:ext cx="8268970" cy="3736975"/>
+          </a:xfrm>
+          <a:prstGeom prst="rect">
+            <a:avLst/>
+          </a:prstGeom>
+        </p:spPr>
+        <p:txBody>
+          <a:bodyPr spcFirstLastPara="1" wrap="square" lIns="91425" tIns="91425" rIns="91425" bIns="91425" anchor="t" anchorCtr="0">
+            <a:normAutofit lnSpcReduction="10000"/>
+          </a:bodyPr>
+          <a:p>
+            <a:pPr marL="457200" lvl="0" indent="-342900" algn="l" rtl="0">
+              <a:spcBef>
+                <a:spcPts val="0"/>
+              </a:spcBef>
+              <a:spcAft>
+                <a:spcPts val="0"/>
+              </a:spcAft>
+              <a:buSzPts val="1800"/>
+              <a:buChar char="+"/>
+            </a:pPr>
+            <a:r>
+              <a:rPr lang="en-US" altLang="en-GB" b="1">
+                <a:sym typeface="+mn-ea"/>
+              </a:rPr>
+              <a:t>Start container again and use kill command</a:t>
+            </a:r>
+            <a:endParaRPr lang="en-US" altLang="en-GB" b="1">
+              <a:sym typeface="+mn-ea"/>
+            </a:endParaRPr>
+          </a:p>
+          <a:p>
+            <a:pPr marL="114300" lvl="0" indent="0" algn="l" rtl="0">
+              <a:spcBef>
+                <a:spcPts val="0"/>
+              </a:spcBef>
+              <a:spcAft>
+                <a:spcPts val="0"/>
+              </a:spcAft>
+              <a:buSzPts val="1800"/>
+              <a:buNone/>
+            </a:pPr>
+            <a:r>
+              <a:rPr lang="en-US" altLang="en-GB" b="1">
+                <a:sym typeface="+mn-ea"/>
+              </a:rPr>
+              <a:t>&gt;&gt; docker kill &lt;container_id&gt;</a:t>
+            </a:r>
+            <a:endParaRPr lang="en-US" altLang="en-GB" b="1">
+              <a:sym typeface="+mn-ea"/>
+            </a:endParaRPr>
+          </a:p>
+          <a:p>
+            <a:pPr marL="457200" lvl="0" indent="-342900" algn="l" rtl="0">
+              <a:spcBef>
+                <a:spcPts val="0"/>
+              </a:spcBef>
+              <a:spcAft>
+                <a:spcPts val="0"/>
+              </a:spcAft>
+              <a:buSzPts val="1800"/>
+              <a:buChar char="+"/>
+            </a:pPr>
+            <a:r>
+              <a:rPr lang="en-US" altLang="en-GB" b="1">
+                <a:sym typeface="+mn-ea"/>
+              </a:rPr>
+              <a:t>Stop the container immediately</a:t>
+            </a:r>
+            <a:endParaRPr lang="en-US" b="1">
+              <a:solidFill>
+                <a:srgbClr val="B45F06"/>
+              </a:solidFill>
+            </a:endParaRPr>
+          </a:p>
+        </p:txBody>
+      </p:sp>
       <p:pic>
         <p:nvPicPr>
           <p:cNvPr id="2" name="Picture 1"/>
@@ -11117,81 +11088,14 @@
         </p:blipFill>
         <p:spPr>
           <a:xfrm>
-            <a:off x="311785" y="1607820"/>
-            <a:ext cx="8582025" cy="2362200"/>
+            <a:off x="570230" y="1825625"/>
+            <a:ext cx="8010525" cy="2743200"/>
           </a:xfrm>
           <a:prstGeom prst="rect">
             <a:avLst/>
           </a:prstGeom>
         </p:spPr>
       </p:pic>
-      <p:sp>
-        <p:nvSpPr>
-          <p:cNvPr id="79" name="Google Shape;79;p15"/>
-          <p:cNvSpPr txBox="1"/>
-          <p:nvPr>
-            <p:ph type="body" idx="1"/>
-          </p:nvPr>
-        </p:nvSpPr>
-        <p:spPr>
-          <a:xfrm>
-            <a:off x="311785" y="831850"/>
-            <a:ext cx="8520430" cy="3736975"/>
-          </a:xfrm>
-          <a:prstGeom prst="rect">
-            <a:avLst/>
-          </a:prstGeom>
-        </p:spPr>
-        <p:txBody>
-          <a:bodyPr spcFirstLastPara="1" wrap="square" lIns="91425" tIns="91425" rIns="91425" bIns="91425" anchor="t" anchorCtr="0">
-            <a:normAutofit lnSpcReduction="10000"/>
-          </a:bodyPr>
-          <a:p>
-            <a:pPr marL="114300" lvl="0" indent="0" algn="l" rtl="0">
-              <a:spcBef>
-                <a:spcPts val="0"/>
-              </a:spcBef>
-              <a:spcAft>
-                <a:spcPts val="0"/>
-              </a:spcAft>
-              <a:buSzPts val="1800"/>
-              <a:buNone/>
-            </a:pPr>
-            <a:r>
-              <a:rPr lang="en-US" altLang="en-GB" b="1">
-                <a:sym typeface="+mn-ea"/>
-              </a:rPr>
-              <a:t>&gt;&gt; docker stop &lt;container_id&gt;</a:t>
-            </a:r>
-            <a:endParaRPr lang="en-US" altLang="en-GB" b="1">
-              <a:sym typeface="+mn-ea"/>
-            </a:endParaRPr>
-          </a:p>
-          <a:p>
-            <a:pPr marL="457200" lvl="0" indent="-342900" algn="l" rtl="0">
-              <a:spcBef>
-                <a:spcPts val="0"/>
-              </a:spcBef>
-              <a:spcAft>
-                <a:spcPts val="0"/>
-              </a:spcAft>
-              <a:buSzPts val="1800"/>
-              <a:buChar char="+"/>
-            </a:pPr>
-            <a:r>
-              <a:rPr lang="en-US" altLang="en-GB" b="1">
-                <a:sym typeface="+mn-ea"/>
-              </a:rPr>
-              <a:t>Waiting for over 10 seconds to stop the container</a:t>
-            </a:r>
-            <a:endParaRPr lang="en-US" b="1">
-              <a:solidFill>
-                <a:srgbClr val="B45F06"/>
-              </a:solidFill>
-            </a:endParaRPr>
-          </a:p>
-        </p:txBody>
-      </p:sp>
     </p:spTree>
   </p:cSld>
   <p:clrMapOvr>
@@ -11526,7 +11430,7 @@
             </a:pPr>
             <a:r>
               <a:rPr lang="en-US" sz="2940"/>
-              <a:t>Stopping container</a:t>
+              <a:t>Multi-Command container</a:t>
             </a:r>
             <a:endParaRPr lang="en-US" sz="2940" b="0">
               <a:solidFill>
@@ -11572,7 +11476,7 @@
               <a:rPr lang="en-US" altLang="en-GB" b="1">
                 <a:sym typeface="+mn-ea"/>
               </a:rPr>
-              <a:t>Start container again and use kill command</a:t>
+              <a:t>First, Settup redis on docker</a:t>
             </a:r>
             <a:endParaRPr lang="en-US" altLang="en-GB" b="1">
               <a:sym typeface="+mn-ea"/>
@@ -11593,28 +11497,7 @@
               <a:rPr lang="en-US" altLang="en-GB" b="1">
                 <a:sym typeface="+mn-ea"/>
               </a:rPr>
-              <a:t>&gt;&gt; docker kill &lt;container_id&gt;</a:t>
-            </a:r>
-            <a:endParaRPr lang="en-US" altLang="en-GB" b="1">
-              <a:sym typeface="+mn-ea"/>
-            </a:endParaRPr>
-          </a:p>
-          <a:p>
-            <a:pPr marL="457200" lvl="0" indent="-342900" algn="l" rtl="0">
-              <a:spcBef>
-                <a:spcPts val="0"/>
-              </a:spcBef>
-              <a:spcAft>
-                <a:spcPts val="0"/>
-              </a:spcAft>
-              <a:buSzPts val="1800"/>
-              <a:buChar char="+"/>
-            </a:pPr>
-            <a:r>
-              <a:rPr lang="en-US" altLang="en-GB" b="1">
-                <a:sym typeface="+mn-ea"/>
-              </a:rPr>
-              <a:t>Stop the container immediately</a:t>
+              <a:t>&gt;&gt; docker run redis</a:t>
             </a:r>
             <a:endParaRPr lang="en-US" b="1">
               <a:solidFill>
@@ -11640,8 +11523,8 @@
         </p:blipFill>
         <p:spPr>
           <a:xfrm>
-            <a:off x="570230" y="1825625"/>
-            <a:ext cx="8010525" cy="2743200"/>
+            <a:off x="976630" y="1978660"/>
+            <a:ext cx="6939280" cy="2514600"/>
           </a:xfrm>
           <a:prstGeom prst="rect">
             <a:avLst/>
@@ -11708,7 +11591,7 @@
             </a:pPr>
             <a:r>
               <a:rPr lang="en-US" sz="2940"/>
-              <a:t>Multi-Command container</a:t>
+              <a:t>Multi-Command Container</a:t>
             </a:r>
             <a:endParaRPr lang="en-US" sz="2940" b="0">
               <a:solidFill>
@@ -11729,7 +11612,7 @@
         <p:spPr>
           <a:xfrm>
             <a:off x="311785" y="831850"/>
-            <a:ext cx="8268970" cy="3736975"/>
+            <a:ext cx="4762500" cy="2052955"/>
           </a:xfrm>
           <a:prstGeom prst="rect">
             <a:avLst/>
@@ -11754,7 +11637,7 @@
               <a:rPr lang="en-US" altLang="en-GB" b="1">
                 <a:sym typeface="+mn-ea"/>
               </a:rPr>
-              <a:t>First, Settup redis on docker</a:t>
+              <a:t>try to run redis-cli but it’s not working because the command run outside the container</a:t>
             </a:r>
             <a:endParaRPr lang="en-US" altLang="en-GB" b="1">
               <a:sym typeface="+mn-ea"/>
@@ -11771,12 +11654,6 @@
               <a:buSzPts val="1800"/>
               <a:buNone/>
             </a:pPr>
-            <a:r>
-              <a:rPr lang="en-US" altLang="en-GB" b="1">
-                <a:sym typeface="+mn-ea"/>
-              </a:rPr>
-              <a:t>&gt;&gt; docker run redis</a:t>
-            </a:r>
             <a:endParaRPr lang="en-US" b="1">
               <a:solidFill>
                 <a:srgbClr val="B45F06"/>
@@ -11787,7 +11664,7 @@
       </p:sp>
       <p:pic>
         <p:nvPicPr>
-          <p:cNvPr id="1" name="Picture 0"/>
+          <p:cNvPr id="2" name="Picture 1"/>
           <p:cNvPicPr>
             <a:picLocks noChangeAspect="1"/>
           </p:cNvPicPr>
@@ -11801,8 +11678,32 @@
         </p:blipFill>
         <p:spPr>
           <a:xfrm>
-            <a:off x="976630" y="1978660"/>
-            <a:ext cx="6939280" cy="2514600"/>
+            <a:off x="375920" y="2404110"/>
+            <a:ext cx="4502150" cy="891540"/>
+          </a:xfrm>
+          <a:prstGeom prst="rect">
+            <a:avLst/>
+          </a:prstGeom>
+        </p:spPr>
+      </p:pic>
+      <p:pic>
+        <p:nvPicPr>
+          <p:cNvPr id="3" name="Picture 2"/>
+          <p:cNvPicPr>
+            <a:picLocks noChangeAspect="1"/>
+          </p:cNvPicPr>
+          <p:nvPr/>
+        </p:nvPicPr>
+        <p:blipFill>
+          <a:blip r:embed="rId2"/>
+          <a:stretch>
+            <a:fillRect/>
+          </a:stretch>
+        </p:blipFill>
+        <p:spPr>
+          <a:xfrm>
+            <a:off x="5126355" y="831215"/>
+            <a:ext cx="3705860" cy="3350260"/>
           </a:xfrm>
           <a:prstGeom prst="rect">
             <a:avLst/>
@@ -11901,27 +11802,6 @@
             <a:normAutofit lnSpcReduction="10000"/>
           </a:bodyPr>
           <a:p>
-            <a:pPr marL="457200" lvl="0" indent="-342900" algn="l" rtl="0">
-              <a:spcBef>
-                <a:spcPts val="0"/>
-              </a:spcBef>
-              <a:spcAft>
-                <a:spcPts val="0"/>
-              </a:spcAft>
-              <a:buSzPts val="1800"/>
-              <a:buChar char="+"/>
-            </a:pPr>
-            <a:r>
-              <a:rPr lang="en-US" altLang="en-GB" b="1">
-                <a:sym typeface="+mn-ea"/>
-              </a:rPr>
-              <a:t>try to run redis-cli but it’s not working because the command run outside the container</a:t>
-            </a:r>
-            <a:endParaRPr lang="en-US" altLang="en-GB" b="1">
-              <a:sym typeface="+mn-ea"/>
-            </a:endParaRPr>
-          </a:p>
-          <a:p>
             <a:pPr marL="114300" lvl="0" indent="0" algn="l" rtl="0">
               <a:spcBef>
                 <a:spcPts val="0"/>
@@ -11956,8 +11836,8 @@
         </p:blipFill>
         <p:spPr>
           <a:xfrm>
-            <a:off x="375920" y="2404110"/>
-            <a:ext cx="4502150" cy="891540"/>
+            <a:off x="5549265" y="751205"/>
+            <a:ext cx="3282950" cy="3458845"/>
           </a:xfrm>
           <a:prstGeom prst="rect">
             <a:avLst/>
@@ -11966,7 +11846,7 @@
       </p:pic>
       <p:pic>
         <p:nvPicPr>
-          <p:cNvPr id="3" name="Picture 2"/>
+          <p:cNvPr id="4" name="Picture 3"/>
           <p:cNvPicPr>
             <a:picLocks noChangeAspect="1"/>
           </p:cNvPicPr>
@@ -11980,8 +11860,32 @@
         </p:blipFill>
         <p:spPr>
           <a:xfrm>
-            <a:off x="5126355" y="831215"/>
-            <a:ext cx="3705860" cy="3350260"/>
+            <a:off x="495935" y="899795"/>
+            <a:ext cx="4972685" cy="1285875"/>
+          </a:xfrm>
+          <a:prstGeom prst="rect">
+            <a:avLst/>
+          </a:prstGeom>
+        </p:spPr>
+      </p:pic>
+      <p:pic>
+        <p:nvPicPr>
+          <p:cNvPr id="6" name="Picture 5"/>
+          <p:cNvPicPr>
+            <a:picLocks noChangeAspect="1"/>
+          </p:cNvPicPr>
+          <p:nvPr/>
+        </p:nvPicPr>
+        <p:blipFill>
+          <a:blip r:embed="rId3"/>
+          <a:stretch>
+            <a:fillRect/>
+          </a:stretch>
+        </p:blipFill>
+        <p:spPr>
+          <a:xfrm>
+            <a:off x="486410" y="2447925"/>
+            <a:ext cx="4982210" cy="1578610"/>
           </a:xfrm>
           <a:prstGeom prst="rect">
             <a:avLst/>
@@ -12048,7 +11952,7 @@
             </a:pPr>
             <a:r>
               <a:rPr lang="en-US" sz="2940"/>
-              <a:t>Multi-Command Container</a:t>
+              <a:t>The purpose of the “IT” flag</a:t>
             </a:r>
             <a:endParaRPr lang="en-US" sz="2940" b="0">
               <a:solidFill>
@@ -12080,6 +11984,27 @@
             <a:normAutofit lnSpcReduction="10000"/>
           </a:bodyPr>
           <a:p>
+            <a:pPr marL="457200" lvl="0" indent="-342900" algn="l" rtl="0">
+              <a:spcBef>
+                <a:spcPts val="0"/>
+              </a:spcBef>
+              <a:spcAft>
+                <a:spcPts val="0"/>
+              </a:spcAft>
+              <a:buSzPts val="1800"/>
+              <a:buChar char="+"/>
+            </a:pPr>
+            <a:r>
+              <a:rPr lang="en-US" altLang="en-GB" b="1">
+                <a:sym typeface="+mn-ea"/>
+              </a:rPr>
+              <a:t>try to run redis-cli but it’s not working because the command run outside the container</a:t>
+            </a:r>
+            <a:endParaRPr lang="en-US" altLang="en-GB" b="1">
+              <a:sym typeface="+mn-ea"/>
+            </a:endParaRPr>
+          </a:p>
+          <a:p>
             <a:pPr marL="114300" lvl="0" indent="0" algn="l" rtl="0">
               <a:spcBef>
                 <a:spcPts val="0"/>
@@ -12100,7 +12025,7 @@
       </p:sp>
       <p:pic>
         <p:nvPicPr>
-          <p:cNvPr id="1" name="Picture 0"/>
+          <p:cNvPr id="2" name="Picture 1"/>
           <p:cNvPicPr>
             <a:picLocks noChangeAspect="1"/>
           </p:cNvPicPr>
@@ -12114,8 +12039,8 @@
         </p:blipFill>
         <p:spPr>
           <a:xfrm>
-            <a:off x="5549265" y="751205"/>
-            <a:ext cx="3282950" cy="3458845"/>
+            <a:off x="375920" y="2404110"/>
+            <a:ext cx="4502150" cy="891540"/>
           </a:xfrm>
           <a:prstGeom prst="rect">
             <a:avLst/>
@@ -12124,7 +12049,7 @@
       </p:pic>
       <p:pic>
         <p:nvPicPr>
-          <p:cNvPr id="4" name="Picture 3"/>
+          <p:cNvPr id="3" name="Picture 2"/>
           <p:cNvPicPr>
             <a:picLocks noChangeAspect="1"/>
           </p:cNvPicPr>
@@ -12138,32 +12063,8 @@
         </p:blipFill>
         <p:spPr>
           <a:xfrm>
-            <a:off x="495935" y="899795"/>
-            <a:ext cx="4972685" cy="1285875"/>
-          </a:xfrm>
-          <a:prstGeom prst="rect">
-            <a:avLst/>
-          </a:prstGeom>
-        </p:spPr>
-      </p:pic>
-      <p:pic>
-        <p:nvPicPr>
-          <p:cNvPr id="6" name="Picture 5"/>
-          <p:cNvPicPr>
-            <a:picLocks noChangeAspect="1"/>
-          </p:cNvPicPr>
-          <p:nvPr/>
-        </p:nvPicPr>
-        <p:blipFill>
-          <a:blip r:embed="rId3"/>
-          <a:stretch>
-            <a:fillRect/>
-          </a:stretch>
-        </p:blipFill>
-        <p:spPr>
-          <a:xfrm>
-            <a:off x="486410" y="2447925"/>
-            <a:ext cx="4982210" cy="1578610"/>
+            <a:off x="5126355" y="831215"/>
+            <a:ext cx="3705860" cy="3350260"/>
           </a:xfrm>
           <a:prstGeom prst="rect">
             <a:avLst/>
@@ -12251,7 +12152,7 @@
         <p:spPr>
           <a:xfrm>
             <a:off x="311785" y="831850"/>
-            <a:ext cx="4762500" cy="2052955"/>
+            <a:ext cx="5139055" cy="1371600"/>
           </a:xfrm>
           <a:prstGeom prst="rect">
             <a:avLst/>
@@ -12276,14 +12177,14 @@
               <a:rPr lang="en-US" altLang="en-GB" b="1">
                 <a:sym typeface="+mn-ea"/>
               </a:rPr>
-              <a:t>try to run redis-cli but it’s not working because the command run outside the container</a:t>
+              <a:t>-i: make sure that any stuff that you type gets direct to STDIN</a:t>
             </a:r>
             <a:endParaRPr lang="en-US" altLang="en-GB" b="1">
               <a:sym typeface="+mn-ea"/>
             </a:endParaRPr>
           </a:p>
           <a:p>
-            <a:pPr marL="114300" lvl="0" indent="0" algn="l" rtl="0">
+            <a:pPr marL="457200" lvl="0" indent="-342900" algn="l" rtl="0">
               <a:spcBef>
                 <a:spcPts val="0"/>
               </a:spcBef>
@@ -12291,8 +12192,14 @@
                 <a:spcPts val="0"/>
               </a:spcAft>
               <a:buSzPts val="1800"/>
-              <a:buNone/>
-            </a:pPr>
+              <a:buChar char="+"/>
+            </a:pPr>
+            <a:r>
+              <a:rPr lang="en-US" altLang="en-GB" b="1">
+                <a:sym typeface="+mn-ea"/>
+              </a:rPr>
+              <a:t>-t: help to show up the result pretty </a:t>
+            </a:r>
             <a:endParaRPr lang="en-US" b="1">
               <a:solidFill>
                 <a:srgbClr val="B45F06"/>
@@ -12317,8 +12224,8 @@
         </p:blipFill>
         <p:spPr>
           <a:xfrm>
-            <a:off x="375920" y="2404110"/>
-            <a:ext cx="4502150" cy="891540"/>
+            <a:off x="5523230" y="1506855"/>
+            <a:ext cx="3381375" cy="2924175"/>
           </a:xfrm>
           <a:prstGeom prst="rect">
             <a:avLst/>
@@ -12327,7 +12234,7 @@
       </p:pic>
       <p:pic>
         <p:nvPicPr>
-          <p:cNvPr id="3" name="Picture 2"/>
+          <p:cNvPr id="4" name="Picture 3"/>
           <p:cNvPicPr>
             <a:picLocks noChangeAspect="1"/>
           </p:cNvPicPr>
@@ -12341,8 +12248,8 @@
         </p:blipFill>
         <p:spPr>
           <a:xfrm>
-            <a:off x="5126355" y="831215"/>
-            <a:ext cx="3705860" cy="3350260"/>
+            <a:off x="409575" y="2204085"/>
+            <a:ext cx="5113655" cy="2226945"/>
           </a:xfrm>
           <a:prstGeom prst="rect">
             <a:avLst/>
@@ -12409,7 +12316,7 @@
             </a:pPr>
             <a:r>
               <a:rPr lang="en-US" sz="2940"/>
-              <a:t>The purpose of the “IT” flag</a:t>
+              <a:t>Getting a Command Prompt in a Container</a:t>
             </a:r>
             <a:endParaRPr lang="en-US" sz="2940" b="0">
               <a:solidFill>
@@ -12430,7 +12337,7 @@
         <p:spPr>
           <a:xfrm>
             <a:off x="311785" y="831850"/>
-            <a:ext cx="5139055" cy="1371600"/>
+            <a:ext cx="8520430" cy="2052955"/>
           </a:xfrm>
           <a:prstGeom prst="rect">
             <a:avLst/>
@@ -12441,7 +12348,7 @@
             <a:normAutofit lnSpcReduction="10000"/>
           </a:bodyPr>
           <a:p>
-            <a:pPr marL="457200" lvl="0" indent="-342900" algn="l" rtl="0">
+            <a:pPr marL="114300" lvl="0" indent="0" algn="l" rtl="0">
               <a:spcBef>
                 <a:spcPts val="0"/>
               </a:spcBef>
@@ -12449,13 +12356,13 @@
                 <a:spcPts val="0"/>
               </a:spcAft>
               <a:buSzPts val="1800"/>
-              <a:buChar char="+"/>
+              <a:buNone/>
             </a:pPr>
             <a:r>
               <a:rPr lang="en-US" altLang="en-GB" b="1">
                 <a:sym typeface="+mn-ea"/>
               </a:rPr>
-              <a:t>-i: make sure that any stuff that you type gets direct to STDIN</a:t>
+              <a:t>&gt;&gt; docker exec -it &lt;container_id&gt; sh</a:t>
             </a:r>
             <a:endParaRPr lang="en-US" altLang="en-GB" b="1">
               <a:sym typeface="+mn-ea"/>
@@ -12476,7 +12383,7 @@
               <a:rPr lang="en-US" altLang="en-GB" b="1">
                 <a:sym typeface="+mn-ea"/>
               </a:rPr>
-              <a:t>-t: help to show up the result pretty </a:t>
+              <a:t>open a Command Prompt to execute some command</a:t>
             </a:r>
             <a:endParaRPr lang="en-US" b="1">
               <a:solidFill>
@@ -12488,7 +12395,7 @@
       </p:sp>
       <p:pic>
         <p:nvPicPr>
-          <p:cNvPr id="1" name="Picture 0"/>
+          <p:cNvPr id="2" name="Picture 1"/>
           <p:cNvPicPr>
             <a:picLocks noChangeAspect="1"/>
           </p:cNvPicPr>
@@ -12502,32 +12409,8 @@
         </p:blipFill>
         <p:spPr>
           <a:xfrm>
-            <a:off x="5523230" y="1506855"/>
-            <a:ext cx="3381375" cy="2924175"/>
-          </a:xfrm>
-          <a:prstGeom prst="rect">
-            <a:avLst/>
-          </a:prstGeom>
-        </p:spPr>
-      </p:pic>
-      <p:pic>
-        <p:nvPicPr>
-          <p:cNvPr id="4" name="Picture 3"/>
-          <p:cNvPicPr>
-            <a:picLocks noChangeAspect="1"/>
-          </p:cNvPicPr>
-          <p:nvPr/>
-        </p:nvPicPr>
-        <p:blipFill>
-          <a:blip r:embed="rId2"/>
-          <a:stretch>
-            <a:fillRect/>
-          </a:stretch>
-        </p:blipFill>
-        <p:spPr>
-          <a:xfrm>
-            <a:off x="409575" y="2204085"/>
-            <a:ext cx="5113655" cy="2226945"/>
+            <a:off x="1659890" y="1649730"/>
+            <a:ext cx="5824220" cy="3177540"/>
           </a:xfrm>
           <a:prstGeom prst="rect">
             <a:avLst/>
@@ -12640,7 +12523,7 @@
               <a:rPr lang="en-US" altLang="en-GB" b="1">
                 <a:sym typeface="+mn-ea"/>
               </a:rPr>
-              <a:t>&gt;&gt; docker exec -it &lt;container_id&gt; sh</a:t>
+              <a:t>&gt;&gt; sh</a:t>
             </a:r>
             <a:endParaRPr lang="en-US" altLang="en-GB" b="1">
               <a:sym typeface="+mn-ea"/>
@@ -12661,7 +12544,28 @@
               <a:rPr lang="en-US" altLang="en-GB" b="1">
                 <a:sym typeface="+mn-ea"/>
               </a:rPr>
-              <a:t>open a Command Prompt to execute some command</a:t>
+              <a:t>Is a name of 	a program and it’s a program that has been executed inside of that container</a:t>
+            </a:r>
+            <a:endParaRPr lang="en-US" altLang="en-GB" b="1">
+              <a:sym typeface="+mn-ea"/>
+            </a:endParaRPr>
+          </a:p>
+          <a:p>
+            <a:pPr marL="457200" lvl="0" indent="-342900" algn="l" rtl="0">
+              <a:spcBef>
+                <a:spcPts val="0"/>
+              </a:spcBef>
+              <a:spcAft>
+                <a:spcPts val="0"/>
+              </a:spcAft>
+              <a:buSzPts val="1800"/>
+              <a:buChar char="+"/>
+            </a:pPr>
+            <a:r>
+              <a:rPr lang="en-US" altLang="en-GB" b="1">
+                <a:sym typeface="+mn-ea"/>
+              </a:rPr>
+              <a:t>Open a Command Prompt to execute some command inside a container</a:t>
             </a:r>
             <a:endParaRPr lang="en-US" b="1">
               <a:solidFill>
@@ -12673,7 +12577,7 @@
       </p:sp>
       <p:pic>
         <p:nvPicPr>
-          <p:cNvPr id="1" name="Picture 0"/>
+          <p:cNvPr id="3" name="Picture 2"/>
           <p:cNvPicPr>
             <a:picLocks noChangeAspect="1"/>
           </p:cNvPicPr>
@@ -12687,8 +12591,8 @@
         </p:blipFill>
         <p:spPr>
           <a:xfrm>
-            <a:off x="1980565" y="2148840"/>
-            <a:ext cx="4569460" cy="2492375"/>
+            <a:off x="1933575" y="2790190"/>
+            <a:ext cx="5276850" cy="1971675"/>
           </a:xfrm>
           <a:prstGeom prst="rect">
             <a:avLst/>
@@ -12755,7 +12659,7 @@
             </a:pPr>
             <a:r>
               <a:rPr lang="en-US" sz="2940"/>
-              <a:t>Getting a Command Prompt in a Container</a:t>
+              <a:t>Starting with a Shell</a:t>
             </a:r>
             <a:endParaRPr lang="en-US" sz="2940" b="0">
               <a:solidFill>
@@ -12801,7 +12705,7 @@
               <a:rPr lang="en-US" altLang="en-GB" b="1">
                 <a:sym typeface="+mn-ea"/>
               </a:rPr>
-              <a:t>&gt;&gt; sh</a:t>
+              <a:t>&gt;&gt; docker run &lt;image_name&gt; --it sh</a:t>
             </a:r>
             <a:endParaRPr lang="en-US" altLang="en-GB" b="1">
               <a:sym typeface="+mn-ea"/>
@@ -12822,28 +12726,7 @@
               <a:rPr lang="en-US" altLang="en-GB" b="1">
                 <a:sym typeface="+mn-ea"/>
               </a:rPr>
-              <a:t>Is a name of 	a program and it’s a program that has been executed inside of that container</a:t>
-            </a:r>
-            <a:endParaRPr lang="en-US" altLang="en-GB" b="1">
-              <a:sym typeface="+mn-ea"/>
-            </a:endParaRPr>
-          </a:p>
-          <a:p>
-            <a:pPr marL="457200" lvl="0" indent="-342900" algn="l" rtl="0">
-              <a:spcBef>
-                <a:spcPts val="0"/>
-              </a:spcBef>
-              <a:spcAft>
-                <a:spcPts val="0"/>
-              </a:spcAft>
-              <a:buSzPts val="1800"/>
-              <a:buChar char="+"/>
-            </a:pPr>
-            <a:r>
-              <a:rPr lang="en-US" altLang="en-GB" b="1">
-                <a:sym typeface="+mn-ea"/>
-              </a:rPr>
-              <a:t>Open a Command Prompt to execute some command inside a container</a:t>
+              <a:t>Start a new shell when run new container</a:t>
             </a:r>
             <a:endParaRPr lang="en-US" b="1">
               <a:solidFill>
@@ -12855,7 +12738,7 @@
       </p:sp>
       <p:pic>
         <p:nvPicPr>
-          <p:cNvPr id="3" name="Picture 2"/>
+          <p:cNvPr id="2" name="Picture 1"/>
           <p:cNvPicPr>
             <a:picLocks noChangeAspect="1"/>
           </p:cNvPicPr>
@@ -12869,8 +12752,8 @@
         </p:blipFill>
         <p:spPr>
           <a:xfrm>
-            <a:off x="1933575" y="2790190"/>
-            <a:ext cx="5276850" cy="1971675"/>
+            <a:off x="2071370" y="1809750"/>
+            <a:ext cx="5000625" cy="2543175"/>
           </a:xfrm>
           <a:prstGeom prst="rect">
             <a:avLst/>
@@ -12947,170 +12830,9 @@
           </a:p>
         </p:txBody>
       </p:sp>
-      <p:sp>
-        <p:nvSpPr>
-          <p:cNvPr id="79" name="Google Shape;79;p15"/>
-          <p:cNvSpPr txBox="1"/>
-          <p:nvPr>
-            <p:ph type="body" idx="1"/>
-          </p:nvPr>
-        </p:nvSpPr>
-        <p:spPr>
-          <a:xfrm>
-            <a:off x="311785" y="831850"/>
-            <a:ext cx="8520430" cy="2052955"/>
-          </a:xfrm>
-          <a:prstGeom prst="rect">
-            <a:avLst/>
-          </a:prstGeom>
-        </p:spPr>
-        <p:txBody>
-          <a:bodyPr spcFirstLastPara="1" wrap="square" lIns="91425" tIns="91425" rIns="91425" bIns="91425" anchor="t" anchorCtr="0">
-            <a:normAutofit lnSpcReduction="10000"/>
-          </a:bodyPr>
-          <a:p>
-            <a:pPr marL="114300" lvl="0" indent="0" algn="l" rtl="0">
-              <a:spcBef>
-                <a:spcPts val="0"/>
-              </a:spcBef>
-              <a:spcAft>
-                <a:spcPts val="0"/>
-              </a:spcAft>
-              <a:buSzPts val="1800"/>
-              <a:buNone/>
-            </a:pPr>
-            <a:r>
-              <a:rPr lang="en-US" altLang="en-GB" b="1">
-                <a:sym typeface="+mn-ea"/>
-              </a:rPr>
-              <a:t>&gt;&gt; docker run &lt;image_name&gt; --it sh</a:t>
-            </a:r>
-            <a:endParaRPr lang="en-US" altLang="en-GB" b="1">
-              <a:sym typeface="+mn-ea"/>
-            </a:endParaRPr>
-          </a:p>
-          <a:p>
-            <a:pPr marL="457200" lvl="0" indent="-342900" algn="l" rtl="0">
-              <a:spcBef>
-                <a:spcPts val="0"/>
-              </a:spcBef>
-              <a:spcAft>
-                <a:spcPts val="0"/>
-              </a:spcAft>
-              <a:buSzPts val="1800"/>
-              <a:buChar char="+"/>
-            </a:pPr>
-            <a:r>
-              <a:rPr lang="en-US" altLang="en-GB" b="1">
-                <a:sym typeface="+mn-ea"/>
-              </a:rPr>
-              <a:t>Start a new shell when run new container</a:t>
-            </a:r>
-            <a:endParaRPr lang="en-US" b="1">
-              <a:solidFill>
-                <a:srgbClr val="B45F06"/>
-              </a:solidFill>
-            </a:endParaRPr>
-          </a:p>
-        </p:txBody>
-      </p:sp>
       <p:pic>
         <p:nvPicPr>
           <p:cNvPr id="2" name="Picture 1"/>
-          <p:cNvPicPr>
-            <a:picLocks noChangeAspect="1"/>
-          </p:cNvPicPr>
-          <p:nvPr/>
-        </p:nvPicPr>
-        <p:blipFill>
-          <a:blip r:embed="rId1"/>
-          <a:stretch>
-            <a:fillRect/>
-          </a:stretch>
-        </p:blipFill>
-        <p:spPr>
-          <a:xfrm>
-            <a:off x="2071370" y="1809750"/>
-            <a:ext cx="5000625" cy="2543175"/>
-          </a:xfrm>
-          <a:prstGeom prst="rect">
-            <a:avLst/>
-          </a:prstGeom>
-        </p:spPr>
-      </p:pic>
-    </p:spTree>
-  </p:cSld>
-  <p:clrMapOvr>
-    <a:masterClrMapping/>
-  </p:clrMapOvr>
-</p:sld>
-</file>
-
-<file path=ppt/slides/slide29.xml><?xml version="1.0" encoding="utf-8"?>
-<p:sld xmlns:a="http://schemas.openxmlformats.org/drawingml/2006/main" xmlns:r="http://schemas.openxmlformats.org/officeDocument/2006/relationships" xmlns:p="http://schemas.openxmlformats.org/presentationml/2006/main">
-  <p:cSld>
-    <p:spTree>
-      <p:nvGrpSpPr>
-        <p:cNvPr id="77" name="Shape 77"/>
-        <p:cNvGrpSpPr/>
-        <p:nvPr/>
-      </p:nvGrpSpPr>
-      <p:grpSpPr>
-        <a:xfrm>
-          <a:off x="0" y="0"/>
-          <a:ext cx="0" cy="0"/>
-          <a:chOff x="0" y="0"/>
-          <a:chExt cx="0" cy="0"/>
-        </a:xfrm>
-      </p:grpSpPr>
-      <p:sp>
-        <p:nvSpPr>
-          <p:cNvPr id="78" name="Google Shape;78;p15"/>
-          <p:cNvSpPr txBox="1"/>
-          <p:nvPr>
-            <p:ph type="title"/>
-          </p:nvPr>
-        </p:nvSpPr>
-        <p:spPr>
-          <a:xfrm>
-            <a:off x="311700" y="123715"/>
-            <a:ext cx="8520600" cy="707400"/>
-          </a:xfrm>
-          <a:prstGeom prst="rect">
-            <a:avLst/>
-          </a:prstGeom>
-        </p:spPr>
-        <p:txBody>
-          <a:bodyPr spcFirstLastPara="1" wrap="square" lIns="91425" tIns="91425" rIns="91425" bIns="91425" anchor="t" anchorCtr="0">
-            <a:normAutofit/>
-          </a:bodyPr>
-          <a:lstStyle/>
-          <a:p>
-            <a:pPr marL="0" lvl="0" indent="0" algn="l" rtl="0">
-              <a:spcBef>
-                <a:spcPts val="0"/>
-              </a:spcBef>
-              <a:spcAft>
-                <a:spcPts val="0"/>
-              </a:spcAft>
-              <a:buSzPts val="990"/>
-              <a:buNone/>
-            </a:pPr>
-            <a:r>
-              <a:rPr lang="en-US" sz="2940"/>
-              <a:t>Starting with a Shell</a:t>
-            </a:r>
-            <a:endParaRPr lang="en-US" sz="2940" b="0">
-              <a:solidFill>
-                <a:srgbClr val="3D85C6"/>
-              </a:solidFill>
-            </a:endParaRPr>
-          </a:p>
-        </p:txBody>
-      </p:sp>
-      <p:pic>
-        <p:nvPicPr>
-          <p:cNvPr id="1" name="Picture 0"/>
           <p:cNvPicPr>
             <a:picLocks noChangeAspect="1"/>
           </p:cNvPicPr>
@@ -13156,6 +12878,71 @@
           </a:prstGeom>
         </p:spPr>
       </p:pic>
+    </p:spTree>
+  </p:cSld>
+  <p:clrMapOvr>
+    <a:masterClrMapping/>
+  </p:clrMapOvr>
+</p:sld>
+</file>
+
+<file path=ppt/slides/slide29.xml><?xml version="1.0" encoding="utf-8"?>
+<p:sld xmlns:a="http://schemas.openxmlformats.org/drawingml/2006/main" xmlns:r="http://schemas.openxmlformats.org/officeDocument/2006/relationships" xmlns:p="http://schemas.openxmlformats.org/presentationml/2006/main">
+  <p:cSld>
+    <p:spTree>
+      <p:nvGrpSpPr>
+        <p:cNvPr id="450" name="Shape 450"/>
+        <p:cNvGrpSpPr/>
+        <p:nvPr/>
+      </p:nvGrpSpPr>
+      <p:grpSpPr>
+        <a:xfrm>
+          <a:off x="0" y="0"/>
+          <a:ext cx="0" cy="0"/>
+          <a:chOff x="0" y="0"/>
+          <a:chExt cx="0" cy="0"/>
+        </a:xfrm>
+      </p:grpSpPr>
+      <p:sp>
+        <p:nvSpPr>
+          <p:cNvPr id="451" name="Google Shape;451;p61"/>
+          <p:cNvSpPr txBox="1"/>
+          <p:nvPr>
+            <p:ph type="title"/>
+          </p:nvPr>
+        </p:nvSpPr>
+        <p:spPr>
+          <a:xfrm>
+            <a:off x="311700" y="814800"/>
+            <a:ext cx="8571300" cy="942000"/>
+          </a:xfrm>
+          <a:prstGeom prst="rect">
+            <a:avLst/>
+          </a:prstGeom>
+        </p:spPr>
+        <p:txBody>
+          <a:bodyPr spcFirstLastPara="1" wrap="square" lIns="91425" tIns="91425" rIns="91425" bIns="91425" anchor="ctr" anchorCtr="0">
+            <a:normAutofit/>
+          </a:bodyPr>
+          <a:lstStyle/>
+          <a:p>
+            <a:pPr marL="0" lvl="0" indent="0" algn="ctr" rtl="0">
+              <a:spcBef>
+                <a:spcPts val="0"/>
+              </a:spcBef>
+              <a:spcAft>
+                <a:spcPts val="0"/>
+              </a:spcAft>
+              <a:buNone/>
+            </a:pPr>
+            <a:r>
+              <a:rPr lang="en-GB"/>
+              <a:t>THANKS FOR LISTENING</a:t>
+            </a:r>
+            <a:endParaRPr lang="en-GB"/>
+          </a:p>
+        </p:txBody>
+      </p:sp>
     </p:spTree>
   </p:cSld>
   <p:clrMapOvr>
@@ -13299,7 +13086,7 @@
       </p:pic>
       <p:pic>
         <p:nvPicPr>
-          <p:cNvPr id="4" name="Picture 3"/>
+          <p:cNvPr id="1" name="Picture 0"/>
           <p:cNvPicPr>
             <a:picLocks noChangeAspect="1"/>
           </p:cNvPicPr>
@@ -13313,79 +13100,14 @@
         </p:blipFill>
         <p:spPr>
           <a:xfrm>
-            <a:off x="4762500" y="1609725"/>
-            <a:ext cx="3735070" cy="2054225"/>
+            <a:off x="4740275" y="1630045"/>
+            <a:ext cx="4091940" cy="2139950"/>
           </a:xfrm>
           <a:prstGeom prst="rect">
             <a:avLst/>
           </a:prstGeom>
         </p:spPr>
       </p:pic>
-    </p:spTree>
-  </p:cSld>
-  <p:clrMapOvr>
-    <a:masterClrMapping/>
-  </p:clrMapOvr>
-</p:sld>
-</file>
-
-<file path=ppt/slides/slide30.xml><?xml version="1.0" encoding="utf-8"?>
-<p:sld xmlns:a="http://schemas.openxmlformats.org/drawingml/2006/main" xmlns:r="http://schemas.openxmlformats.org/officeDocument/2006/relationships" xmlns:p="http://schemas.openxmlformats.org/presentationml/2006/main">
-  <p:cSld>
-    <p:spTree>
-      <p:nvGrpSpPr>
-        <p:cNvPr id="450" name="Shape 450"/>
-        <p:cNvGrpSpPr/>
-        <p:nvPr/>
-      </p:nvGrpSpPr>
-      <p:grpSpPr>
-        <a:xfrm>
-          <a:off x="0" y="0"/>
-          <a:ext cx="0" cy="0"/>
-          <a:chOff x="0" y="0"/>
-          <a:chExt cx="0" cy="0"/>
-        </a:xfrm>
-      </p:grpSpPr>
-      <p:sp>
-        <p:nvSpPr>
-          <p:cNvPr id="451" name="Google Shape;451;p61"/>
-          <p:cNvSpPr txBox="1"/>
-          <p:nvPr>
-            <p:ph type="title"/>
-          </p:nvPr>
-        </p:nvSpPr>
-        <p:spPr>
-          <a:xfrm>
-            <a:off x="311700" y="814800"/>
-            <a:ext cx="8571300" cy="942000"/>
-          </a:xfrm>
-          <a:prstGeom prst="rect">
-            <a:avLst/>
-          </a:prstGeom>
-        </p:spPr>
-        <p:txBody>
-          <a:bodyPr spcFirstLastPara="1" wrap="square" lIns="91425" tIns="91425" rIns="91425" bIns="91425" anchor="ctr" anchorCtr="0">
-            <a:normAutofit/>
-          </a:bodyPr>
-          <a:lstStyle/>
-          <a:p>
-            <a:pPr marL="0" lvl="0" indent="0" algn="ctr" rtl="0">
-              <a:spcBef>
-                <a:spcPts val="0"/>
-              </a:spcBef>
-              <a:spcAft>
-                <a:spcPts val="0"/>
-              </a:spcAft>
-              <a:buNone/>
-            </a:pPr>
-            <a:r>
-              <a:rPr lang="en-GB"/>
-              <a:t>THANKS FOR LISTENING</a:t>
-            </a:r>
-            <a:endParaRPr lang="en-GB"/>
-          </a:p>
-        </p:txBody>
-      </p:sp>
     </p:spTree>
   </p:cSld>
   <p:clrMapOvr>
@@ -13451,47 +13173,6 @@
             <a:endParaRPr lang="en-US" sz="2940" b="0">
               <a:solidFill>
                 <a:srgbClr val="3D85C6"/>
-              </a:solidFill>
-            </a:endParaRPr>
-          </a:p>
-        </p:txBody>
-      </p:sp>
-      <p:sp>
-        <p:nvSpPr>
-          <p:cNvPr id="79" name="Google Shape;79;p15"/>
-          <p:cNvSpPr txBox="1"/>
-          <p:nvPr>
-            <p:ph type="body" idx="1"/>
-          </p:nvPr>
-        </p:nvSpPr>
-        <p:spPr>
-          <a:xfrm>
-            <a:off x="311785" y="831215"/>
-            <a:ext cx="8520430" cy="3737610"/>
-          </a:xfrm>
-          <a:prstGeom prst="rect">
-            <a:avLst/>
-          </a:prstGeom>
-        </p:spPr>
-        <p:txBody>
-          <a:bodyPr spcFirstLastPara="1" wrap="square" lIns="91425" tIns="91425" rIns="91425" bIns="91425" anchor="t" anchorCtr="0">
-            <a:normAutofit/>
-          </a:bodyPr>
-          <a:lstStyle/>
-          <a:p>
-            <a:pPr marL="457200" lvl="0" indent="-342900" algn="l" rtl="0">
-              <a:spcBef>
-                <a:spcPts val="0"/>
-              </a:spcBef>
-              <a:spcAft>
-                <a:spcPts val="0"/>
-              </a:spcAft>
-              <a:buSzPts val="1800"/>
-              <a:buChar char="+"/>
-            </a:pPr>
-            <a:endParaRPr lang="en-US" b="1">
-              <a:solidFill>
-                <a:srgbClr val="B45F06"/>
               </a:solidFill>
             </a:endParaRPr>
           </a:p>
@@ -13675,8 +13356,8 @@
         </p:blipFill>
         <p:spPr>
           <a:xfrm>
-            <a:off x="1897380" y="1804035"/>
-            <a:ext cx="5348605" cy="2246630"/>
+            <a:off x="1435735" y="1934210"/>
+            <a:ext cx="6271895" cy="2634615"/>
           </a:xfrm>
           <a:prstGeom prst="rect">
             <a:avLst/>
@@ -13837,8 +13518,8 @@
         </p:blipFill>
         <p:spPr>
           <a:xfrm>
-            <a:off x="4256405" y="990600"/>
-            <a:ext cx="4438650" cy="3419475"/>
+            <a:off x="4008120" y="831215"/>
+            <a:ext cx="4824095" cy="3716655"/>
           </a:xfrm>
           <a:prstGeom prst="rect">
             <a:avLst/>
@@ -13999,7 +13680,7 @@
         </p:blipFill>
         <p:spPr>
           <a:xfrm>
-            <a:off x="577215" y="2004695"/>
+            <a:off x="311785" y="2026285"/>
             <a:ext cx="4172585" cy="2363470"/>
           </a:xfrm>
           <a:prstGeom prst="rect">
@@ -14023,8 +13704,8 @@
         </p:blipFill>
         <p:spPr>
           <a:xfrm>
-            <a:off x="5003800" y="2132330"/>
-            <a:ext cx="3641090" cy="2108200"/>
+            <a:off x="4749800" y="2026285"/>
+            <a:ext cx="3895090" cy="2255520"/>
           </a:xfrm>
           <a:prstGeom prst="rect">
             <a:avLst/>
@@ -14210,7 +13891,7 @@
         <p:spPr>
           <a:xfrm>
             <a:off x="546100" y="1844040"/>
-            <a:ext cx="6162675" cy="723900"/>
+            <a:ext cx="6784340" cy="796925"/>
           </a:xfrm>
           <a:prstGeom prst="rect">
             <a:avLst/>
@@ -14428,8 +14109,8 @@
         </p:blipFill>
         <p:spPr>
           <a:xfrm>
-            <a:off x="634365" y="2456180"/>
-            <a:ext cx="7875270" cy="2037080"/>
+            <a:off x="311785" y="2332355"/>
+            <a:ext cx="8466455" cy="2190115"/>
           </a:xfrm>
           <a:prstGeom prst="rect">
             <a:avLst/>

</xml_diff>